<commit_message>
week 7/8: updated slides
</commit_message>
<xml_diff>
--- a/week_07_08/week_07_08.pptx
+++ b/week_07_08/week_07_08.pptx
@@ -5,7 +5,7 @@
     <p:sldMasterId id="2147483840" r:id="rId1"/>
   </p:sldMasterIdLst>
   <p:notesMasterIdLst>
-    <p:notesMasterId r:id="rId14"/>
+    <p:notesMasterId r:id="rId19"/>
   </p:notesMasterIdLst>
   <p:sldIdLst>
     <p:sldId id="256" r:id="rId2"/>
@@ -17,9 +17,14 @@
     <p:sldId id="288" r:id="rId8"/>
     <p:sldId id="289" r:id="rId9"/>
     <p:sldId id="291" r:id="rId10"/>
-    <p:sldId id="287" r:id="rId11"/>
-    <p:sldId id="294" r:id="rId12"/>
-    <p:sldId id="292" r:id="rId13"/>
+    <p:sldId id="292" r:id="rId11"/>
+    <p:sldId id="287" r:id="rId12"/>
+    <p:sldId id="294" r:id="rId13"/>
+    <p:sldId id="295" r:id="rId14"/>
+    <p:sldId id="296" r:id="rId15"/>
+    <p:sldId id="297" r:id="rId16"/>
+    <p:sldId id="298" r:id="rId17"/>
+    <p:sldId id="299" r:id="rId18"/>
   </p:sldIdLst>
   <p:sldSz cx="12192000" cy="6858000"/>
   <p:notesSz cx="6858000" cy="9144000"/>
@@ -208,7 +213,7 @@
           <a:p>
             <a:fld id="{A756DEA0-F944-5946-9B95-BC7B5255CD05}" type="datetimeFigureOut">
               <a:rPr lang="en-US" smtClean="0"/>
-              <a:t>3/2/16</a:t>
+              <a:t>3/9/16</a:t>
             </a:fld>
             <a:endParaRPr lang="en-US"/>
           </a:p>
@@ -625,7 +630,7 @@
           <a:p>
             <a:fld id="{0FF3EE0D-70A9-3744-80A0-179DFFBD3C67}" type="slidenum">
               <a:rPr lang="en-US" smtClean="0"/>
-              <a:t>12</a:t>
+              <a:t>10</a:t>
             </a:fld>
             <a:endParaRPr lang="en-US"/>
           </a:p>
@@ -635,6 +640,90 @@
     <p:extLst>
       <p:ext uri="{BB962C8B-B14F-4D97-AF65-F5344CB8AC3E}">
         <p14:creationId xmlns:p14="http://schemas.microsoft.com/office/powerpoint/2010/main" val="706690228"/>
+      </p:ext>
+    </p:extLst>
+  </p:cSld>
+  <p:clrMapOvr>
+    <a:masterClrMapping/>
+  </p:clrMapOvr>
+</p:notes>
+</file>
+
+<file path=ppt/notesSlides/notesSlide3.xml><?xml version="1.0" encoding="utf-8"?>
+<p:notes xmlns:a="http://schemas.openxmlformats.org/drawingml/2006/main" xmlns:r="http://schemas.openxmlformats.org/officeDocument/2006/relationships" xmlns:p="http://schemas.openxmlformats.org/presentationml/2006/main">
+  <p:cSld>
+    <p:spTree>
+      <p:nvGrpSpPr>
+        <p:cNvPr id="1" name=""/>
+        <p:cNvGrpSpPr/>
+        <p:nvPr/>
+      </p:nvGrpSpPr>
+      <p:grpSpPr>
+        <a:xfrm>
+          <a:off x="0" y="0"/>
+          <a:ext cx="0" cy="0"/>
+          <a:chOff x="0" y="0"/>
+          <a:chExt cx="0" cy="0"/>
+        </a:xfrm>
+      </p:grpSpPr>
+      <p:sp>
+        <p:nvSpPr>
+          <p:cNvPr id="2" name="Slide Image Placeholder 1"/>
+          <p:cNvSpPr>
+            <a:spLocks noGrp="1" noRot="1" noChangeAspect="1"/>
+          </p:cNvSpPr>
+          <p:nvPr>
+            <p:ph type="sldImg"/>
+          </p:nvPr>
+        </p:nvSpPr>
+        <p:spPr/>
+      </p:sp>
+      <p:sp>
+        <p:nvSpPr>
+          <p:cNvPr id="3" name="Notes Placeholder 2"/>
+          <p:cNvSpPr>
+            <a:spLocks noGrp="1"/>
+          </p:cNvSpPr>
+          <p:nvPr>
+            <p:ph type="body" idx="1"/>
+          </p:nvPr>
+        </p:nvSpPr>
+        <p:spPr/>
+        <p:txBody>
+          <a:bodyPr/>
+          <a:lstStyle/>
+          <a:p>
+            <a:endParaRPr lang="en-US" dirty="0"/>
+          </a:p>
+        </p:txBody>
+      </p:sp>
+      <p:sp>
+        <p:nvSpPr>
+          <p:cNvPr id="4" name="Slide Number Placeholder 3"/>
+          <p:cNvSpPr>
+            <a:spLocks noGrp="1"/>
+          </p:cNvSpPr>
+          <p:nvPr>
+            <p:ph type="sldNum" sz="quarter" idx="10"/>
+          </p:nvPr>
+        </p:nvSpPr>
+        <p:spPr/>
+        <p:txBody>
+          <a:bodyPr/>
+          <a:lstStyle/>
+          <a:p>
+            <a:fld id="{0FF3EE0D-70A9-3744-80A0-179DFFBD3C67}" type="slidenum">
+              <a:rPr lang="en-US" smtClean="0"/>
+              <a:t>17</a:t>
+            </a:fld>
+            <a:endParaRPr lang="en-US"/>
+          </a:p>
+        </p:txBody>
+      </p:sp>
+    </p:spTree>
+    <p:extLst>
+      <p:ext uri="{BB962C8B-B14F-4D97-AF65-F5344CB8AC3E}">
+        <p14:creationId xmlns:p14="http://schemas.microsoft.com/office/powerpoint/2010/main" val="425509898"/>
       </p:ext>
     </p:extLst>
   </p:cSld>
@@ -812,7 +901,7 @@
           <a:p>
             <a:fld id="{9E016143-E03C-4CFD-AFDC-14E5BDEA754C}" type="datetimeFigureOut">
               <a:rPr lang="en-US" dirty="0"/>
-              <a:t>3/2/16</a:t>
+              <a:t>3/9/16</a:t>
             </a:fld>
             <a:endParaRPr lang="en-US" dirty="0"/>
           </a:p>
@@ -1036,7 +1125,7 @@
           <a:p>
             <a:fld id="{C033E54A-A8CA-48C1-9504-691B58049D29}" type="datetimeFigureOut">
               <a:rPr lang="en-US" dirty="0"/>
-              <a:t>3/2/16</a:t>
+              <a:t>3/9/16</a:t>
             </a:fld>
             <a:endParaRPr lang="en-US" dirty="0"/>
           </a:p>
@@ -1211,7 +1300,7 @@
           <a:p>
             <a:fld id="{B5F6C806-BBF7-471C-9527-881CE2266695}" type="datetimeFigureOut">
               <a:rPr lang="en-US" dirty="0"/>
-              <a:t>3/2/16</a:t>
+              <a:t>3/9/16</a:t>
             </a:fld>
             <a:endParaRPr lang="en-US" dirty="0"/>
           </a:p>
@@ -1376,7 +1465,7 @@
           <a:p>
             <a:fld id="{78C94063-DF36-4330-A365-08DA1FA5B7D6}" type="datetimeFigureOut">
               <a:rPr lang="en-US" dirty="0"/>
-              <a:t>3/2/16</a:t>
+              <a:t>3/9/16</a:t>
             </a:fld>
             <a:endParaRPr lang="en-US" dirty="0"/>
           </a:p>
@@ -1625,7 +1714,7 @@
           <a:p>
             <a:fld id="{908A7C6C-0F39-4D70-8E8D-FE5B9C95FA73}" type="datetimeFigureOut">
               <a:rPr lang="en-US" dirty="0"/>
-              <a:t>3/2/16</a:t>
+              <a:t>3/9/16</a:t>
             </a:fld>
             <a:endParaRPr lang="en-US" dirty="0"/>
           </a:p>
@@ -1946,7 +2035,7 @@
           <a:p>
             <a:fld id="{DFCFA4AC-08CC-42CE-BD01-C191750A04EC}" type="datetimeFigureOut">
               <a:rPr lang="en-US" dirty="0"/>
-              <a:t>3/2/16</a:t>
+              <a:t>3/9/16</a:t>
             </a:fld>
             <a:endParaRPr lang="en-US" dirty="0"/>
           </a:p>
@@ -2392,7 +2481,7 @@
           <a:p>
             <a:fld id="{1BA7A723-92A7-435B-B681-F25B092FEFEB}" type="datetimeFigureOut">
               <a:rPr lang="en-US" dirty="0"/>
-              <a:t>3/2/16</a:t>
+              <a:t>3/9/16</a:t>
             </a:fld>
             <a:endParaRPr lang="en-US" dirty="0"/>
           </a:p>
@@ -2505,7 +2594,7 @@
           <a:p>
             <a:fld id="{4F170639-886C-4FCF-9EAB-ABB5DA3F3F4A}" type="datetimeFigureOut">
               <a:rPr lang="en-US" dirty="0"/>
-              <a:t>3/2/16</a:t>
+              <a:t>3/9/16</a:t>
             </a:fld>
             <a:endParaRPr lang="en-US" dirty="0"/>
           </a:p>
@@ -2595,7 +2684,7 @@
           <a:p>
             <a:fld id="{22230651-31F4-45D2-98AE-A2108F41BC07}" type="datetimeFigureOut">
               <a:rPr lang="en-US" dirty="0"/>
-              <a:t>3/2/16</a:t>
+              <a:t>3/9/16</a:t>
             </a:fld>
             <a:endParaRPr lang="en-US" dirty="0"/>
           </a:p>
@@ -2877,7 +2966,7 @@
           <a:p>
             <a:fld id="{6F53789A-C914-4DB1-8815-80B5EC7335C5}" type="datetimeFigureOut">
               <a:rPr lang="en-US" dirty="0"/>
-              <a:t>3/2/16</a:t>
+              <a:t>3/9/16</a:t>
             </a:fld>
             <a:endParaRPr lang="en-US" dirty="0"/>
           </a:p>
@@ -3197,7 +3286,7 @@
           <a:p>
             <a:fld id="{5E6440AA-91A0-436F-8FDB-C0F939DCAE21}" type="datetimeFigureOut">
               <a:rPr lang="en-US" dirty="0"/>
-              <a:t>3/2/16</a:t>
+              <a:t>3/9/16</a:t>
             </a:fld>
             <a:endParaRPr lang="en-US" dirty="0"/>
           </a:p>
@@ -3446,7 +3535,7 @@
           <a:p>
             <a:fld id="{0E59FD0C-5451-4CA0-86AF-E70AE3279989}" type="datetimeFigureOut">
               <a:rPr lang="en-US" dirty="0"/>
-              <a:t>3/2/16</a:t>
+              <a:t>3/9/16</a:t>
             </a:fld>
             <a:endParaRPr lang="en-US" dirty="0"/>
           </a:p>
@@ -3973,7 +4062,6 @@
               <a:rPr lang="en-US" dirty="0" smtClean="0"/>
               <a:t>Weeks 7 and 8: Inheritance and Polymorphism</a:t>
             </a:r>
-            <a:endParaRPr lang="en-US" dirty="0" smtClean="0"/>
           </a:p>
           <a:p>
             <a:r>
@@ -3998,6 +4086,130 @@
 </file>
 
 <file path=ppt/slides/slide10.xml><?xml version="1.0" encoding="utf-8"?>
+<p:sld xmlns:a="http://schemas.openxmlformats.org/drawingml/2006/main" xmlns:r="http://schemas.openxmlformats.org/officeDocument/2006/relationships" xmlns:p="http://schemas.openxmlformats.org/presentationml/2006/main">
+  <p:cSld>
+    <p:spTree>
+      <p:nvGrpSpPr>
+        <p:cNvPr id="1" name=""/>
+        <p:cNvGrpSpPr/>
+        <p:nvPr/>
+      </p:nvGrpSpPr>
+      <p:grpSpPr>
+        <a:xfrm>
+          <a:off x="0" y="0"/>
+          <a:ext cx="0" cy="0"/>
+          <a:chOff x="0" y="0"/>
+          <a:chExt cx="0" cy="0"/>
+        </a:xfrm>
+      </p:grpSpPr>
+      <p:sp>
+        <p:nvSpPr>
+          <p:cNvPr id="3" name="Title 2"/>
+          <p:cNvSpPr>
+            <a:spLocks noGrp="1"/>
+          </p:cNvSpPr>
+          <p:nvPr>
+            <p:ph type="title"/>
+          </p:nvPr>
+        </p:nvSpPr>
+        <p:spPr/>
+        <p:txBody>
+          <a:bodyPr/>
+          <a:lstStyle/>
+          <a:p>
+            <a:r>
+              <a:rPr lang="en-US" dirty="0" smtClean="0"/>
+              <a:t>Exercise #1</a:t>
+            </a:r>
+            <a:endParaRPr lang="en-US" dirty="0"/>
+          </a:p>
+        </p:txBody>
+      </p:sp>
+      <p:sp>
+        <p:nvSpPr>
+          <p:cNvPr id="4" name="Text Placeholder 3"/>
+          <p:cNvSpPr>
+            <a:spLocks noGrp="1"/>
+          </p:cNvSpPr>
+          <p:nvPr>
+            <p:ph idx="1"/>
+          </p:nvPr>
+        </p:nvSpPr>
+        <p:spPr/>
+        <p:txBody>
+          <a:bodyPr anchor="ctr">
+            <a:normAutofit/>
+          </a:bodyPr>
+          <a:lstStyle/>
+          <a:p>
+            <a:pPr marL="0" indent="0">
+              <a:buNone/>
+            </a:pPr>
+            <a:r>
+              <a:rPr lang="en-US" sz="2400" dirty="0" smtClean="0"/>
+              <a:t>Write </a:t>
+            </a:r>
+            <a:r>
+              <a:rPr lang="en-US" sz="2400" dirty="0"/>
+              <a:t>a program that includes a class representing contact information fora person including their name and email address.  This class should </a:t>
+            </a:r>
+            <a:r>
+              <a:rPr lang="en-US" sz="2400" dirty="0" smtClean="0"/>
+              <a:t>include a </a:t>
+            </a:r>
+            <a:r>
+              <a:rPr lang="en-US" sz="2400" dirty="0"/>
+              <a:t>method for displaying the contact's name and email address.  The </a:t>
+            </a:r>
+            <a:r>
+              <a:rPr lang="en-US" sz="2400" dirty="0" smtClean="0"/>
+              <a:t>program should </a:t>
+            </a:r>
+            <a:r>
+              <a:rPr lang="en-US" sz="2400" dirty="0"/>
+              <a:t>also include a class for business contacts that extends the </a:t>
+            </a:r>
+            <a:r>
+              <a:rPr lang="en-US" sz="2400" dirty="0" smtClean="0"/>
+              <a:t>contact class </a:t>
+            </a:r>
+            <a:r>
+              <a:rPr lang="en-US" sz="2400" dirty="0"/>
+              <a:t>and stores the contact's phone number.  The business contact </a:t>
+            </a:r>
+            <a:r>
+              <a:rPr lang="en-US" sz="2400" dirty="0" smtClean="0"/>
+              <a:t>class should </a:t>
+            </a:r>
+            <a:r>
+              <a:rPr lang="en-US" sz="2400" dirty="0"/>
+              <a:t>override the base class's method that displays the name and </a:t>
+            </a:r>
+            <a:r>
+              <a:rPr lang="en-US" sz="2400" dirty="0" smtClean="0"/>
+              <a:t>email address </a:t>
+            </a:r>
+            <a:r>
+              <a:rPr lang="en-US" sz="2400" dirty="0"/>
+              <a:t>so that it displays the phone number in addition to the name and email address. Create instances of both classes to demonstrate functionality.</a:t>
+            </a:r>
+          </a:p>
+        </p:txBody>
+      </p:sp>
+    </p:spTree>
+    <p:extLst>
+      <p:ext uri="{BB962C8B-B14F-4D97-AF65-F5344CB8AC3E}">
+        <p14:creationId xmlns:p14="http://schemas.microsoft.com/office/powerpoint/2010/main" val="1458956191"/>
+      </p:ext>
+    </p:extLst>
+  </p:cSld>
+  <p:clrMapOvr>
+    <a:masterClrMapping/>
+  </p:clrMapOvr>
+</p:sld>
+</file>
+
+<file path=ppt/slides/slide11.xml><?xml version="1.0" encoding="utf-8"?>
 <p:sld xmlns:a="http://schemas.openxmlformats.org/drawingml/2006/main" xmlns:r="http://schemas.openxmlformats.org/officeDocument/2006/relationships" xmlns:p="http://schemas.openxmlformats.org/presentationml/2006/main">
   <p:cSld>
     <p:spTree>
@@ -4286,97 +4498,6 @@
 </p:sld>
 </file>
 
-<file path=ppt/slides/slide11.xml><?xml version="1.0" encoding="utf-8"?>
-<p:sld xmlns:a="http://schemas.openxmlformats.org/drawingml/2006/main" xmlns:r="http://schemas.openxmlformats.org/officeDocument/2006/relationships" xmlns:p="http://schemas.openxmlformats.org/presentationml/2006/main">
-  <p:cSld>
-    <p:spTree>
-      <p:nvGrpSpPr>
-        <p:cNvPr id="1" name=""/>
-        <p:cNvGrpSpPr/>
-        <p:nvPr/>
-      </p:nvGrpSpPr>
-      <p:grpSpPr>
-        <a:xfrm>
-          <a:off x="0" y="0"/>
-          <a:ext cx="0" cy="0"/>
-          <a:chOff x="0" y="0"/>
-          <a:chExt cx="0" cy="0"/>
-        </a:xfrm>
-      </p:grpSpPr>
-      <p:sp>
-        <p:nvSpPr>
-          <p:cNvPr id="2" name="Title 1"/>
-          <p:cNvSpPr>
-            <a:spLocks noGrp="1"/>
-          </p:cNvSpPr>
-          <p:nvPr>
-            <p:ph type="title"/>
-          </p:nvPr>
-        </p:nvSpPr>
-        <p:spPr/>
-        <p:txBody>
-          <a:bodyPr/>
-          <a:lstStyle/>
-          <a:p>
-            <a:r>
-              <a:rPr lang="en-US" dirty="0" smtClean="0"/>
-              <a:t>Equality</a:t>
-            </a:r>
-            <a:endParaRPr lang="en-US" dirty="0"/>
-          </a:p>
-        </p:txBody>
-      </p:sp>
-      <p:sp>
-        <p:nvSpPr>
-          <p:cNvPr id="3" name="Content Placeholder 2"/>
-          <p:cNvSpPr>
-            <a:spLocks noGrp="1"/>
-          </p:cNvSpPr>
-          <p:nvPr>
-            <p:ph idx="1"/>
-          </p:nvPr>
-        </p:nvSpPr>
-        <p:spPr/>
-        <p:txBody>
-          <a:bodyPr anchor="ctr">
-            <a:normAutofit/>
-          </a:bodyPr>
-          <a:lstStyle/>
-          <a:p>
-            <a:r>
-              <a:rPr lang="en-US" sz="2800" dirty="0" smtClean="0"/>
-              <a:t>== and != operators represent reference equality</a:t>
-            </a:r>
-          </a:p>
-          <a:p>
-            <a:r>
-              <a:rPr lang="en-US" sz="2800" dirty="0" smtClean="0"/>
-              <a:t>We can override the </a:t>
-            </a:r>
-            <a:r>
-              <a:rPr lang="en-US" sz="2800" dirty="0" err="1" smtClean="0"/>
-              <a:t>Object.equals</a:t>
-            </a:r>
-            <a:r>
-              <a:rPr lang="en-US" sz="2800" dirty="0" smtClean="0"/>
-              <a:t>() method to implement equality that is more meaningful for the Classes we define</a:t>
-            </a:r>
-          </a:p>
-        </p:txBody>
-      </p:sp>
-    </p:spTree>
-    <p:extLst>
-      <p:ext uri="{BB962C8B-B14F-4D97-AF65-F5344CB8AC3E}">
-        <p14:creationId xmlns:p14="http://schemas.microsoft.com/office/powerpoint/2010/main" val="1518371828"/>
-      </p:ext>
-    </p:extLst>
-  </p:cSld>
-  <p:clrMapOvr>
-    <a:masterClrMapping/>
-  </p:clrMapOvr>
-</p:sld>
-</file>
-
 <file path=ppt/slides/slide12.xml><?xml version="1.0" encoding="utf-8"?>
 <p:sld xmlns:a="http://schemas.openxmlformats.org/drawingml/2006/main" xmlns:r="http://schemas.openxmlformats.org/officeDocument/2006/relationships" xmlns:p="http://schemas.openxmlformats.org/presentationml/2006/main">
   <p:cSld>
@@ -4396,7 +4517,7 @@
       </p:grpSpPr>
       <p:sp>
         <p:nvSpPr>
-          <p:cNvPr id="3" name="Title 2"/>
+          <p:cNvPr id="2" name="Title 1"/>
           <p:cNvSpPr>
             <a:spLocks noGrp="1"/>
           </p:cNvSpPr>
@@ -4411,15 +4532,15 @@
           <a:p>
             <a:r>
               <a:rPr lang="en-US" dirty="0" smtClean="0"/>
-              <a:t>Exercise #1</a:t>
-            </a:r>
-            <a:endParaRPr lang="en-US" dirty="0"/>
-          </a:p>
-        </p:txBody>
-      </p:sp>
-      <p:sp>
-        <p:nvSpPr>
-          <p:cNvPr id="4" name="Text Placeholder 3"/>
+              <a:t>Equality</a:t>
+            </a:r>
+            <a:endParaRPr lang="en-US" dirty="0"/>
+          </a:p>
+        </p:txBody>
+      </p:sp>
+      <p:sp>
+        <p:nvSpPr>
+          <p:cNvPr id="3" name="Content Placeholder 2"/>
           <p:cNvSpPr>
             <a:spLocks noGrp="1"/>
           </p:cNvSpPr>
@@ -4434,65 +4555,592 @@
           </a:bodyPr>
           <a:lstStyle/>
           <a:p>
-            <a:pPr marL="0" indent="0">
-              <a:buNone/>
-            </a:pPr>
-            <a:r>
-              <a:rPr lang="en-US" sz="2400" dirty="0" smtClean="0"/>
-              <a:t>Write </a:t>
-            </a:r>
-            <a:r>
-              <a:rPr lang="en-US" sz="2400" dirty="0"/>
-              <a:t>a program that includes a class representing contact information fora person including their name and email address.  This class should </a:t>
-            </a:r>
-            <a:r>
-              <a:rPr lang="en-US" sz="2400" dirty="0" smtClean="0"/>
-              <a:t>include a </a:t>
-            </a:r>
-            <a:r>
-              <a:rPr lang="en-US" sz="2400" dirty="0"/>
-              <a:t>method for displaying the contact's name and email address.  The </a:t>
-            </a:r>
-            <a:r>
-              <a:rPr lang="en-US" sz="2400" dirty="0" smtClean="0"/>
-              <a:t>program should </a:t>
-            </a:r>
-            <a:r>
-              <a:rPr lang="en-US" sz="2400" dirty="0"/>
-              <a:t>also include a class for business contacts that extends the </a:t>
-            </a:r>
-            <a:r>
-              <a:rPr lang="en-US" sz="2400" dirty="0" smtClean="0"/>
-              <a:t>contact class </a:t>
-            </a:r>
-            <a:r>
-              <a:rPr lang="en-US" sz="2400" dirty="0"/>
-              <a:t>and stores the contact's phone number.  The business contact </a:t>
-            </a:r>
-            <a:r>
-              <a:rPr lang="en-US" sz="2400" dirty="0" smtClean="0"/>
-              <a:t>class should </a:t>
-            </a:r>
-            <a:r>
-              <a:rPr lang="en-US" sz="2400" dirty="0"/>
-              <a:t>override the base class's method that displays the name and </a:t>
-            </a:r>
-            <a:r>
-              <a:rPr lang="en-US" sz="2400" dirty="0" smtClean="0"/>
-              <a:t>email address </a:t>
-            </a:r>
-            <a:r>
-              <a:rPr lang="en-US" sz="2400" dirty="0"/>
-              <a:t>so that it displays the phone number in addition to the name and email address. Create instances of both classes to demonstrate functionality.</a:t>
-            </a:r>
-            <a:endParaRPr lang="en-US" sz="2400" dirty="0"/>
+            <a:r>
+              <a:rPr lang="en-US" sz="2800" dirty="0" smtClean="0"/>
+              <a:t>== and != operators represent reference equality</a:t>
+            </a:r>
+          </a:p>
+          <a:p>
+            <a:r>
+              <a:rPr lang="en-US" sz="2800" dirty="0" smtClean="0"/>
+              <a:t>We can override the </a:t>
+            </a:r>
+            <a:r>
+              <a:rPr lang="en-US" sz="2800" dirty="0" err="1" smtClean="0"/>
+              <a:t>Object.equals</a:t>
+            </a:r>
+            <a:r>
+              <a:rPr lang="en-US" sz="2800" dirty="0" smtClean="0"/>
+              <a:t>() method to implement equality that is more meaningful for the Classes we define</a:t>
+            </a:r>
           </a:p>
         </p:txBody>
       </p:sp>
     </p:spTree>
     <p:extLst>
       <p:ext uri="{BB962C8B-B14F-4D97-AF65-F5344CB8AC3E}">
-        <p14:creationId xmlns:p14="http://schemas.microsoft.com/office/powerpoint/2010/main" val="1458956191"/>
+        <p14:creationId xmlns:p14="http://schemas.microsoft.com/office/powerpoint/2010/main" val="1518371828"/>
+      </p:ext>
+    </p:extLst>
+  </p:cSld>
+  <p:clrMapOvr>
+    <a:masterClrMapping/>
+  </p:clrMapOvr>
+</p:sld>
+</file>
+
+<file path=ppt/slides/slide13.xml><?xml version="1.0" encoding="utf-8"?>
+<p:sld xmlns:a="http://schemas.openxmlformats.org/drawingml/2006/main" xmlns:r="http://schemas.openxmlformats.org/officeDocument/2006/relationships" xmlns:p="http://schemas.openxmlformats.org/presentationml/2006/main">
+  <p:cSld>
+    <p:spTree>
+      <p:nvGrpSpPr>
+        <p:cNvPr id="1" name=""/>
+        <p:cNvGrpSpPr/>
+        <p:nvPr/>
+      </p:nvGrpSpPr>
+      <p:grpSpPr>
+        <a:xfrm>
+          <a:off x="0" y="0"/>
+          <a:ext cx="0" cy="0"/>
+          <a:chOff x="0" y="0"/>
+          <a:chExt cx="0" cy="0"/>
+        </a:xfrm>
+      </p:grpSpPr>
+      <p:sp>
+        <p:nvSpPr>
+          <p:cNvPr id="2" name="Title 1"/>
+          <p:cNvSpPr>
+            <a:spLocks noGrp="1"/>
+          </p:cNvSpPr>
+          <p:nvPr>
+            <p:ph type="title"/>
+          </p:nvPr>
+        </p:nvSpPr>
+        <p:spPr/>
+        <p:txBody>
+          <a:bodyPr/>
+          <a:lstStyle/>
+          <a:p>
+            <a:r>
+              <a:rPr lang="en-US" dirty="0" smtClean="0"/>
+              <a:t>Composition	</a:t>
+            </a:r>
+            <a:endParaRPr lang="en-US" dirty="0"/>
+          </a:p>
+        </p:txBody>
+      </p:sp>
+      <p:sp>
+        <p:nvSpPr>
+          <p:cNvPr id="3" name="Content Placeholder 2"/>
+          <p:cNvSpPr>
+            <a:spLocks noGrp="1"/>
+          </p:cNvSpPr>
+          <p:nvPr>
+            <p:ph idx="1"/>
+          </p:nvPr>
+        </p:nvSpPr>
+        <p:spPr/>
+        <p:txBody>
+          <a:bodyPr>
+            <a:noAutofit/>
+          </a:bodyPr>
+          <a:lstStyle/>
+          <a:p>
+            <a:r>
+              <a:rPr lang="en-US" sz="2400" dirty="0" smtClean="0"/>
+              <a:t>Implementation inheritance breaks encapsulation: derived class relies on implementation of base class</a:t>
+            </a:r>
+          </a:p>
+          <a:p>
+            <a:r>
+              <a:rPr lang="en-US" sz="2400" dirty="0" smtClean="0"/>
+              <a:t>Changes to base class can result in broken derived classes</a:t>
+            </a:r>
+          </a:p>
+          <a:p>
+            <a:r>
+              <a:rPr lang="en-US" sz="2400" dirty="0" smtClean="0"/>
+              <a:t>Can also provide functionally similar to multiple implementation inheritance</a:t>
+            </a:r>
+          </a:p>
+          <a:p>
+            <a:r>
+              <a:rPr lang="en-US" sz="2400" dirty="0" smtClean="0"/>
+              <a:t>We can </a:t>
+            </a:r>
+            <a:r>
+              <a:rPr lang="en-US" sz="2400" i="1" dirty="0" smtClean="0"/>
+              <a:t>wrap </a:t>
+            </a:r>
+            <a:r>
+              <a:rPr lang="en-US" sz="2400" dirty="0" smtClean="0"/>
+              <a:t>other classes with our classes using </a:t>
+            </a:r>
+            <a:r>
+              <a:rPr lang="en-US" sz="2400" i="1" dirty="0" smtClean="0"/>
+              <a:t>composition</a:t>
+            </a:r>
+          </a:p>
+          <a:p>
+            <a:r>
+              <a:rPr lang="en-US" sz="2400" dirty="0" smtClean="0"/>
+              <a:t>Inheritance describes a “is-a” relationship, composition describes a “has-a” relationship</a:t>
+            </a:r>
+            <a:endParaRPr lang="en-US" sz="2400" dirty="0"/>
+          </a:p>
+        </p:txBody>
+      </p:sp>
+    </p:spTree>
+    <p:extLst>
+      <p:ext uri="{BB962C8B-B14F-4D97-AF65-F5344CB8AC3E}">
+        <p14:creationId xmlns:p14="http://schemas.microsoft.com/office/powerpoint/2010/main" val="950000972"/>
+      </p:ext>
+    </p:extLst>
+  </p:cSld>
+  <p:clrMapOvr>
+    <a:masterClrMapping/>
+  </p:clrMapOvr>
+</p:sld>
+</file>
+
+<file path=ppt/slides/slide14.xml><?xml version="1.0" encoding="utf-8"?>
+<p:sld xmlns:a="http://schemas.openxmlformats.org/drawingml/2006/main" xmlns:r="http://schemas.openxmlformats.org/officeDocument/2006/relationships" xmlns:p="http://schemas.openxmlformats.org/presentationml/2006/main">
+  <p:cSld>
+    <p:spTree>
+      <p:nvGrpSpPr>
+        <p:cNvPr id="1" name=""/>
+        <p:cNvGrpSpPr/>
+        <p:nvPr/>
+      </p:nvGrpSpPr>
+      <p:grpSpPr>
+        <a:xfrm>
+          <a:off x="0" y="0"/>
+          <a:ext cx="0" cy="0"/>
+          <a:chOff x="0" y="0"/>
+          <a:chExt cx="0" cy="0"/>
+        </a:xfrm>
+      </p:grpSpPr>
+      <p:sp>
+        <p:nvSpPr>
+          <p:cNvPr id="4" name="Title 3"/>
+          <p:cNvSpPr>
+            <a:spLocks noGrp="1"/>
+          </p:cNvSpPr>
+          <p:nvPr>
+            <p:ph type="title"/>
+          </p:nvPr>
+        </p:nvSpPr>
+        <p:spPr/>
+        <p:txBody>
+          <a:bodyPr/>
+          <a:lstStyle/>
+          <a:p>
+            <a:r>
+              <a:rPr lang="en-US" dirty="0" smtClean="0"/>
+              <a:t>Polymorphism</a:t>
+            </a:r>
+            <a:endParaRPr lang="en-US" dirty="0"/>
+          </a:p>
+        </p:txBody>
+      </p:sp>
+      <p:sp>
+        <p:nvSpPr>
+          <p:cNvPr id="5" name="Text Placeholder 4"/>
+          <p:cNvSpPr>
+            <a:spLocks noGrp="1"/>
+          </p:cNvSpPr>
+          <p:nvPr>
+            <p:ph type="body" idx="1"/>
+          </p:nvPr>
+        </p:nvSpPr>
+        <p:spPr/>
+        <p:txBody>
+          <a:bodyPr/>
+          <a:lstStyle/>
+          <a:p>
+            <a:r>
+              <a:rPr lang="en-US" dirty="0" smtClean="0"/>
+              <a:t>The ability to treat an object as being of different types</a:t>
+            </a:r>
+            <a:endParaRPr lang="en-US" dirty="0"/>
+          </a:p>
+        </p:txBody>
+      </p:sp>
+    </p:spTree>
+    <p:extLst>
+      <p:ext uri="{BB962C8B-B14F-4D97-AF65-F5344CB8AC3E}">
+        <p14:creationId xmlns:p14="http://schemas.microsoft.com/office/powerpoint/2010/main" val="1688347340"/>
+      </p:ext>
+    </p:extLst>
+  </p:cSld>
+  <p:clrMapOvr>
+    <a:masterClrMapping/>
+  </p:clrMapOvr>
+</p:sld>
+</file>
+
+<file path=ppt/slides/slide15.xml><?xml version="1.0" encoding="utf-8"?>
+<p:sld xmlns:a="http://schemas.openxmlformats.org/drawingml/2006/main" xmlns:r="http://schemas.openxmlformats.org/officeDocument/2006/relationships" xmlns:p="http://schemas.openxmlformats.org/presentationml/2006/main">
+  <p:cSld>
+    <p:spTree>
+      <p:nvGrpSpPr>
+        <p:cNvPr id="1" name=""/>
+        <p:cNvGrpSpPr/>
+        <p:nvPr/>
+      </p:nvGrpSpPr>
+      <p:grpSpPr>
+        <a:xfrm>
+          <a:off x="0" y="0"/>
+          <a:ext cx="0" cy="0"/>
+          <a:chOff x="0" y="0"/>
+          <a:chExt cx="0" cy="0"/>
+        </a:xfrm>
+      </p:grpSpPr>
+      <p:sp>
+        <p:nvSpPr>
+          <p:cNvPr id="4" name="Title 3"/>
+          <p:cNvSpPr>
+            <a:spLocks noGrp="1"/>
+          </p:cNvSpPr>
+          <p:nvPr>
+            <p:ph type="title"/>
+          </p:nvPr>
+        </p:nvSpPr>
+        <p:spPr/>
+        <p:txBody>
+          <a:bodyPr/>
+          <a:lstStyle/>
+          <a:p>
+            <a:r>
+              <a:rPr lang="en-US" dirty="0" smtClean="0"/>
+              <a:t>Types of polymorphism in Java</a:t>
+            </a:r>
+            <a:endParaRPr lang="en-US" dirty="0"/>
+          </a:p>
+        </p:txBody>
+      </p:sp>
+      <p:sp>
+        <p:nvSpPr>
+          <p:cNvPr id="5" name="Content Placeholder 4"/>
+          <p:cNvSpPr>
+            <a:spLocks noGrp="1"/>
+          </p:cNvSpPr>
+          <p:nvPr>
+            <p:ph idx="1"/>
+          </p:nvPr>
+        </p:nvSpPr>
+        <p:spPr/>
+        <p:txBody>
+          <a:bodyPr/>
+          <a:lstStyle/>
+          <a:p>
+            <a:r>
+              <a:rPr lang="en-US" sz="2000" i="1" dirty="0" smtClean="0"/>
+              <a:t>Coercion</a:t>
+            </a:r>
+            <a:r>
+              <a:rPr lang="en-US" sz="2000" dirty="0" smtClean="0"/>
+              <a:t> – an operation servers </a:t>
+            </a:r>
+            <a:r>
+              <a:rPr lang="en-US" sz="2000" dirty="0" err="1" smtClean="0"/>
+              <a:t>mutliple</a:t>
+            </a:r>
+            <a:r>
+              <a:rPr lang="en-US" sz="2000" dirty="0" smtClean="0"/>
+              <a:t> types through implicit conversion, e.g. division is defined for two </a:t>
+            </a:r>
+            <a:r>
+              <a:rPr lang="en-US" sz="2000" dirty="0" err="1" smtClean="0"/>
+              <a:t>ints</a:t>
+            </a:r>
+            <a:r>
+              <a:rPr lang="en-US" sz="2000" dirty="0" smtClean="0"/>
+              <a:t> and two doubles but not an </a:t>
+            </a:r>
+            <a:r>
+              <a:rPr lang="en-US" sz="2000" dirty="0" err="1" smtClean="0"/>
+              <a:t>int</a:t>
+            </a:r>
+            <a:r>
+              <a:rPr lang="en-US" sz="2000" dirty="0" smtClean="0"/>
+              <a:t> and a double but we can perform the operation between an </a:t>
+            </a:r>
+            <a:r>
+              <a:rPr lang="en-US" sz="2000" dirty="0" err="1" smtClean="0"/>
+              <a:t>int</a:t>
+            </a:r>
+            <a:r>
+              <a:rPr lang="en-US" sz="2000" dirty="0" smtClean="0"/>
+              <a:t> and a double</a:t>
+            </a:r>
+          </a:p>
+          <a:p>
+            <a:r>
+              <a:rPr lang="en-US" sz="2000" i="1" dirty="0" smtClean="0"/>
+              <a:t>Overloading</a:t>
+            </a:r>
+            <a:r>
+              <a:rPr lang="en-US" sz="2000" dirty="0" smtClean="0"/>
+              <a:t> – the same operator or method can take different parameters</a:t>
+            </a:r>
+          </a:p>
+          <a:p>
+            <a:r>
+              <a:rPr lang="en-US" sz="2000" i="1" dirty="0" smtClean="0"/>
+              <a:t>Parametric</a:t>
+            </a:r>
+            <a:r>
+              <a:rPr lang="en-US" sz="2000" dirty="0" smtClean="0"/>
+              <a:t> – within a class declaration, a field name can associate with different types and a method can associate with different parameter and return types</a:t>
+            </a:r>
+          </a:p>
+          <a:p>
+            <a:r>
+              <a:rPr lang="en-US" sz="2000" i="1" dirty="0" smtClean="0"/>
+              <a:t>Subtype</a:t>
+            </a:r>
+            <a:r>
+              <a:rPr lang="en-US" sz="2000" dirty="0" smtClean="0"/>
+              <a:t> – when a subclass is used in a superclass context, a call to the </a:t>
+            </a:r>
+            <a:r>
+              <a:rPr lang="en-US" sz="2000" dirty="0" err="1" smtClean="0"/>
+              <a:t>supeclass’s</a:t>
+            </a:r>
+            <a:r>
+              <a:rPr lang="en-US" sz="2000" dirty="0" smtClean="0"/>
+              <a:t> method results in the execution of the subclass’s method</a:t>
+            </a:r>
+          </a:p>
+          <a:p>
+            <a:endParaRPr lang="en-US" dirty="0"/>
+          </a:p>
+        </p:txBody>
+      </p:sp>
+    </p:spTree>
+    <p:extLst>
+      <p:ext uri="{BB962C8B-B14F-4D97-AF65-F5344CB8AC3E}">
+        <p14:creationId xmlns:p14="http://schemas.microsoft.com/office/powerpoint/2010/main" val="456158696"/>
+      </p:ext>
+    </p:extLst>
+  </p:cSld>
+  <p:clrMapOvr>
+    <a:masterClrMapping/>
+  </p:clrMapOvr>
+</p:sld>
+</file>
+
+<file path=ppt/slides/slide16.xml><?xml version="1.0" encoding="utf-8"?>
+<p:sld xmlns:a="http://schemas.openxmlformats.org/drawingml/2006/main" xmlns:r="http://schemas.openxmlformats.org/officeDocument/2006/relationships" xmlns:p="http://schemas.openxmlformats.org/presentationml/2006/main">
+  <p:cSld>
+    <p:spTree>
+      <p:nvGrpSpPr>
+        <p:cNvPr id="1" name=""/>
+        <p:cNvGrpSpPr/>
+        <p:nvPr/>
+      </p:nvGrpSpPr>
+      <p:grpSpPr>
+        <a:xfrm>
+          <a:off x="0" y="0"/>
+          <a:ext cx="0" cy="0"/>
+          <a:chOff x="0" y="0"/>
+          <a:chExt cx="0" cy="0"/>
+        </a:xfrm>
+      </p:grpSpPr>
+      <p:sp>
+        <p:nvSpPr>
+          <p:cNvPr id="2" name="Title 1"/>
+          <p:cNvSpPr>
+            <a:spLocks noGrp="1"/>
+          </p:cNvSpPr>
+          <p:nvPr>
+            <p:ph type="title"/>
+          </p:nvPr>
+        </p:nvSpPr>
+        <p:spPr/>
+        <p:txBody>
+          <a:bodyPr/>
+          <a:lstStyle/>
+          <a:p>
+            <a:r>
+              <a:rPr lang="en-US" dirty="0" err="1" smtClean="0"/>
+              <a:t>Upcasting</a:t>
+            </a:r>
+            <a:r>
+              <a:rPr lang="en-US" dirty="0" smtClean="0"/>
+              <a:t>, Late Binding, and </a:t>
+            </a:r>
+            <a:r>
+              <a:rPr lang="en-US" dirty="0" err="1" smtClean="0"/>
+              <a:t>Downcasting</a:t>
+            </a:r>
+            <a:endParaRPr lang="en-US" dirty="0"/>
+          </a:p>
+        </p:txBody>
+      </p:sp>
+      <p:sp>
+        <p:nvSpPr>
+          <p:cNvPr id="3" name="Content Placeholder 2"/>
+          <p:cNvSpPr>
+            <a:spLocks noGrp="1"/>
+          </p:cNvSpPr>
+          <p:nvPr>
+            <p:ph idx="1"/>
+          </p:nvPr>
+        </p:nvSpPr>
+        <p:spPr/>
+        <p:txBody>
+          <a:bodyPr>
+            <a:normAutofit/>
+          </a:bodyPr>
+          <a:lstStyle/>
+          <a:p>
+            <a:r>
+              <a:rPr lang="en-US" sz="2400" i="1" dirty="0" err="1" smtClean="0"/>
+              <a:t>Upcasting</a:t>
+            </a:r>
+            <a:r>
+              <a:rPr lang="en-US" sz="2400" dirty="0" smtClean="0"/>
+              <a:t> –converting an instance of a subclass to a superclass without the need for the cast operator</a:t>
+            </a:r>
+          </a:p>
+          <a:p>
+            <a:r>
+              <a:rPr lang="en-US" sz="2400" i="1" dirty="0" smtClean="0"/>
+              <a:t>Late Binding </a:t>
+            </a:r>
+            <a:r>
+              <a:rPr lang="en-US" sz="2400" dirty="0" smtClean="0"/>
+              <a:t>– when working with class hierarchies and </a:t>
+            </a:r>
+            <a:r>
+              <a:rPr lang="en-US" sz="2400" dirty="0" err="1" smtClean="0"/>
+              <a:t>upcasting</a:t>
+            </a:r>
+            <a:r>
+              <a:rPr lang="en-US" sz="2400" dirty="0" smtClean="0"/>
+              <a:t> objects, Java might not know which method to execute at compile time (the superclass’ method or the subclass’ method); the compiler inserts an instruction to rely on the object rather than the type for executing the appropriate method at run time.</a:t>
+            </a:r>
+          </a:p>
+          <a:p>
+            <a:r>
+              <a:rPr lang="en-US" sz="2400" i="1" dirty="0" err="1" smtClean="0"/>
+              <a:t>Downcasting</a:t>
+            </a:r>
+            <a:r>
+              <a:rPr lang="en-US" sz="2400" i="1" dirty="0" smtClean="0"/>
+              <a:t> </a:t>
+            </a:r>
+            <a:r>
+              <a:rPr lang="en-US" sz="2400" dirty="0" smtClean="0"/>
+              <a:t>– explicitly casting an instance of a superclass to an instance of a subclass; this is not always safe</a:t>
+            </a:r>
+            <a:endParaRPr lang="en-US" sz="2400" dirty="0"/>
+          </a:p>
+        </p:txBody>
+      </p:sp>
+    </p:spTree>
+    <p:extLst>
+      <p:ext uri="{BB962C8B-B14F-4D97-AF65-F5344CB8AC3E}">
+        <p14:creationId xmlns:p14="http://schemas.microsoft.com/office/powerpoint/2010/main" val="1163262004"/>
+      </p:ext>
+    </p:extLst>
+  </p:cSld>
+  <p:clrMapOvr>
+    <a:masterClrMapping/>
+  </p:clrMapOvr>
+</p:sld>
+</file>
+
+<file path=ppt/slides/slide17.xml><?xml version="1.0" encoding="utf-8"?>
+<p:sld xmlns:a="http://schemas.openxmlformats.org/drawingml/2006/main" xmlns:r="http://schemas.openxmlformats.org/officeDocument/2006/relationships" xmlns:p="http://schemas.openxmlformats.org/presentationml/2006/main">
+  <p:cSld>
+    <p:spTree>
+      <p:nvGrpSpPr>
+        <p:cNvPr id="1" name=""/>
+        <p:cNvGrpSpPr/>
+        <p:nvPr/>
+      </p:nvGrpSpPr>
+      <p:grpSpPr>
+        <a:xfrm>
+          <a:off x="0" y="0"/>
+          <a:ext cx="0" cy="0"/>
+          <a:chOff x="0" y="0"/>
+          <a:chExt cx="0" cy="0"/>
+        </a:xfrm>
+      </p:grpSpPr>
+      <p:sp>
+        <p:nvSpPr>
+          <p:cNvPr id="3" name="Title 2"/>
+          <p:cNvSpPr>
+            <a:spLocks noGrp="1"/>
+          </p:cNvSpPr>
+          <p:nvPr>
+            <p:ph type="title"/>
+          </p:nvPr>
+        </p:nvSpPr>
+        <p:spPr/>
+        <p:txBody>
+          <a:bodyPr/>
+          <a:lstStyle/>
+          <a:p>
+            <a:r>
+              <a:rPr lang="en-US" dirty="0" smtClean="0"/>
+              <a:t>Exercise </a:t>
+            </a:r>
+            <a:r>
+              <a:rPr lang="en-US" dirty="0" smtClean="0"/>
+              <a:t>#2</a:t>
+            </a:r>
+            <a:endParaRPr lang="en-US" dirty="0"/>
+          </a:p>
+        </p:txBody>
+      </p:sp>
+      <p:sp>
+        <p:nvSpPr>
+          <p:cNvPr id="4" name="Text Placeholder 3"/>
+          <p:cNvSpPr>
+            <a:spLocks noGrp="1"/>
+          </p:cNvSpPr>
+          <p:nvPr>
+            <p:ph idx="1"/>
+          </p:nvPr>
+        </p:nvSpPr>
+        <p:spPr/>
+        <p:txBody>
+          <a:bodyPr anchor="ctr">
+            <a:normAutofit/>
+          </a:bodyPr>
+          <a:lstStyle/>
+          <a:p>
+            <a:pPr marL="0" indent="0">
+              <a:buNone/>
+            </a:pPr>
+            <a:r>
+              <a:rPr lang="en-US" sz="2400" dirty="0"/>
+              <a:t>Add a class to the previous example that represents a collection of contacts, both of the base class and the derived class. The collection class should include a single method to add a contact, regardless of class, to the collection - this demonstrates </a:t>
+            </a:r>
+            <a:r>
+              <a:rPr lang="en-US" sz="2400" dirty="0" err="1"/>
+              <a:t>upcasting</a:t>
+            </a:r>
+            <a:r>
+              <a:rPr lang="en-US" sz="2400" dirty="0"/>
+              <a:t>. </a:t>
+            </a:r>
+            <a:r>
+              <a:rPr lang="en-US" sz="2400"/>
+              <a:t>The collection class should also include a method to iterate through the contacts and call their display methods - this demonstrates late binding.</a:t>
+            </a:r>
+            <a:endParaRPr lang="en-US" sz="2400" dirty="0"/>
+          </a:p>
+        </p:txBody>
+      </p:sp>
+    </p:spTree>
+    <p:extLst>
+      <p:ext uri="{BB962C8B-B14F-4D97-AF65-F5344CB8AC3E}">
+        <p14:creationId xmlns:p14="http://schemas.microsoft.com/office/powerpoint/2010/main" val="621386237"/>
       </p:ext>
     </p:extLst>
   </p:cSld>
@@ -4565,11 +5213,7 @@
             </a:r>
             <a:r>
               <a:rPr lang="en-US" sz="2800" dirty="0" smtClean="0"/>
-              <a:t>, pp. </a:t>
-            </a:r>
-            <a:r>
-              <a:rPr lang="en-US" sz="2800" dirty="0" smtClean="0"/>
-              <a:t>141-167, 169-174</a:t>
+              <a:t>, pp. 141-167, 169-174</a:t>
             </a:r>
             <a:endParaRPr lang="en-US" sz="2800" i="1" dirty="0"/>
           </a:p>
@@ -4719,21 +5363,13 @@
           <a:p>
             <a:r>
               <a:rPr lang="en-US" sz="3200" dirty="0" smtClean="0"/>
-              <a:t>We often classify things by saying things like “cars are a </a:t>
-            </a:r>
+              <a:t>We often classify things by saying things like “cars are a kind of vehicle” or “squares are a kind of rectangle and a rectangle is a kind of shape”.</a:t>
+            </a:r>
+          </a:p>
+          <a:p>
             <a:r>
               <a:rPr lang="en-US" sz="3200" dirty="0" smtClean="0"/>
-              <a:t>kind of vehicle” or “squares are a kind of rectangle and a rectangle is a kind of shape”.</a:t>
-            </a:r>
-          </a:p>
-          <a:p>
-            <a:r>
-              <a:rPr lang="en-US" sz="3200" dirty="0" smtClean="0"/>
-              <a:t>From a software development point of view, we mean cars </a:t>
-            </a:r>
-            <a:r>
-              <a:rPr lang="en-US" sz="3200" dirty="0" smtClean="0"/>
-              <a:t>have state and behaviors common to vehicles.</a:t>
+              <a:t>From a software development point of view, we mean cars have state and behaviors common to vehicles.</a:t>
             </a:r>
           </a:p>
           <a:p>
@@ -4865,11 +5501,7 @@
           <a:p>
             <a:r>
               <a:rPr lang="en-US" sz="2000" dirty="0" smtClean="0"/>
-              <a:t>In Java, </a:t>
-            </a:r>
-            <a:r>
-              <a:rPr lang="en-US" sz="2000" dirty="0" smtClean="0"/>
-              <a:t>implementation inheritance implies interface inheritance</a:t>
+              <a:t>In Java, implementation inheritance implies interface inheritance</a:t>
             </a:r>
             <a:endParaRPr lang="en-US" sz="2000" dirty="0"/>
           </a:p>
@@ -4987,7 +5619,6 @@
               <a:rPr lang="en-US" sz="2400" dirty="0" smtClean="0"/>
               <a:t>We can specify more specific methods and fields in the subclass</a:t>
             </a:r>
-            <a:endParaRPr lang="en-US" sz="2400" dirty="0" smtClean="0"/>
           </a:p>
         </p:txBody>
       </p:sp>
@@ -5126,16 +5757,7 @@
                 </a:solidFill>
                 <a:latin typeface="Consolas" panose="020B0609020204030204" pitchFamily="49" charset="0"/>
               </a:rPr>
-              <a:t> </a:t>
-            </a:r>
-            <a:r>
-              <a:rPr lang="en-US" altLang="en-US" sz="2000" dirty="0" smtClean="0">
-                <a:solidFill>
-                  <a:srgbClr val="FF0000"/>
-                </a:solidFill>
-                <a:latin typeface="Consolas" panose="020B0609020204030204" pitchFamily="49" charset="0"/>
-              </a:rPr>
-              <a:t>   // member declarations</a:t>
+              <a:t>    // member declarations</a:t>
             </a:r>
           </a:p>
           <a:p>
@@ -5666,7 +6288,6 @@
               <a:rPr lang="en-US" sz="2000" dirty="0" smtClean="0"/>
               <a:t>annotation to distinguish from overloaded methods</a:t>
             </a:r>
-            <a:endParaRPr lang="en-US" sz="2000" dirty="0" smtClean="0"/>
           </a:p>
         </p:txBody>
       </p:sp>

</xml_diff>

<commit_message>
week 7,8: clarify protected
</commit_message>
<xml_diff>
--- a/week_07_08/week_07_08.pptx
+++ b/week_07_08/week_07_08.pptx
@@ -213,7 +213,7 @@
           <a:p>
             <a:fld id="{A756DEA0-F944-5946-9B95-BC7B5255CD05}" type="datetimeFigureOut">
               <a:rPr lang="en-US" smtClean="0"/>
-              <a:t>10/10/2016</a:t>
+              <a:t>2/28/17</a:t>
             </a:fld>
             <a:endParaRPr lang="en-US"/>
           </a:p>
@@ -900,7 +900,7 @@
           <a:p>
             <a:fld id="{C5EA75F5-9C53-4C57-B9F1-F3208CA9B7F4}" type="datetime1">
               <a:rPr lang="en-US" smtClean="0"/>
-              <a:t>10/10/2016</a:t>
+              <a:t>2/28/17</a:t>
             </a:fld>
             <a:endParaRPr lang="en-US" dirty="0"/>
           </a:p>
@@ -1124,7 +1124,7 @@
           <a:p>
             <a:fld id="{FC196B55-95CD-4416-8964-A30564121383}" type="datetime1">
               <a:rPr lang="en-US" smtClean="0"/>
-              <a:t>10/10/2016</a:t>
+              <a:t>2/28/17</a:t>
             </a:fld>
             <a:endParaRPr lang="en-US" dirty="0"/>
           </a:p>
@@ -1299,7 +1299,7 @@
           <a:p>
             <a:fld id="{70C2EC10-3AAA-4469-8818-D58D91D054BE}" type="datetime1">
               <a:rPr lang="en-US" smtClean="0"/>
-              <a:t>10/10/2016</a:t>
+              <a:t>2/28/17</a:t>
             </a:fld>
             <a:endParaRPr lang="en-US" dirty="0"/>
           </a:p>
@@ -1464,7 +1464,7 @@
           <a:p>
             <a:fld id="{09EF0F6F-D2AB-4DA5-8AD1-6900E3639D38}" type="datetime1">
               <a:rPr lang="en-US" smtClean="0"/>
-              <a:t>10/10/2016</a:t>
+              <a:t>2/28/17</a:t>
             </a:fld>
             <a:endParaRPr lang="en-US" dirty="0"/>
           </a:p>
@@ -1713,7 +1713,7 @@
           <a:p>
             <a:fld id="{989B7EAF-0C39-44E8-8499-6BA407F3AEBC}" type="datetime1">
               <a:rPr lang="en-US" smtClean="0"/>
-              <a:t>10/10/2016</a:t>
+              <a:t>2/28/17</a:t>
             </a:fld>
             <a:endParaRPr lang="en-US" dirty="0"/>
           </a:p>
@@ -2034,7 +2034,7 @@
           <a:p>
             <a:fld id="{5886F527-0E87-4BCD-B70D-567B75B5FC54}" type="datetime1">
               <a:rPr lang="en-US" smtClean="0"/>
-              <a:t>10/10/2016</a:t>
+              <a:t>2/28/17</a:t>
             </a:fld>
             <a:endParaRPr lang="en-US" dirty="0"/>
           </a:p>
@@ -2480,7 +2480,7 @@
           <a:p>
             <a:fld id="{A0DF246D-505E-42AC-8833-29EE4713D20B}" type="datetime1">
               <a:rPr lang="en-US" smtClean="0"/>
-              <a:t>10/10/2016</a:t>
+              <a:t>2/28/17</a:t>
             </a:fld>
             <a:endParaRPr lang="en-US" dirty="0"/>
           </a:p>
@@ -2593,7 +2593,7 @@
           <a:p>
             <a:fld id="{2890B447-952E-4F59-AC1F-0116EA635D33}" type="datetime1">
               <a:rPr lang="en-US" smtClean="0"/>
-              <a:t>10/10/2016</a:t>
+              <a:t>2/28/17</a:t>
             </a:fld>
             <a:endParaRPr lang="en-US" dirty="0"/>
           </a:p>
@@ -2683,7 +2683,7 @@
           <a:p>
             <a:fld id="{3EF54D9E-748D-41D1-8E9A-189407821B85}" type="datetime1">
               <a:rPr lang="en-US" smtClean="0"/>
-              <a:t>10/10/2016</a:t>
+              <a:t>2/28/17</a:t>
             </a:fld>
             <a:endParaRPr lang="en-US" dirty="0"/>
           </a:p>
@@ -2965,7 +2965,7 @@
           <a:p>
             <a:fld id="{7C9B8561-1BBF-41EC-9127-6AF41D23B667}" type="datetime1">
               <a:rPr lang="en-US" smtClean="0"/>
-              <a:t>10/10/2016</a:t>
+              <a:t>2/28/17</a:t>
             </a:fld>
             <a:endParaRPr lang="en-US" dirty="0"/>
           </a:p>
@@ -3285,7 +3285,7 @@
           <a:p>
             <a:fld id="{059F584D-11ED-4273-A4D2-F852542F5BB5}" type="datetime1">
               <a:rPr lang="en-US" smtClean="0"/>
-              <a:t>10/10/2016</a:t>
+              <a:t>2/28/17</a:t>
             </a:fld>
             <a:endParaRPr lang="en-US" dirty="0"/>
           </a:p>
@@ -3534,7 +3534,7 @@
           <a:p>
             <a:fld id="{C347BE70-8F30-4E43-BA14-F2F900FE7F6E}" type="datetime1">
               <a:rPr lang="en-US" smtClean="0"/>
-              <a:t>10/10/2016</a:t>
+              <a:t>2/28/17</a:t>
             </a:fld>
             <a:endParaRPr lang="en-US" dirty="0"/>
           </a:p>
@@ -4274,14 +4274,14 @@
                 <a:gridCol w="3083906">
                   <a:extLst>
                     <a:ext uri="{9D8B030D-6E8A-4147-A177-3AD203B41FA5}">
-                      <a16:colId xmlns:a16="http://schemas.microsoft.com/office/drawing/2014/main" val="20000"/>
+                      <a16:colId xmlns:a16="http://schemas.microsoft.com/office/drawing/2014/main" xmlns="" val="20000"/>
                     </a:ext>
                   </a:extLst>
                 </a:gridCol>
                 <a:gridCol w="5510820">
                   <a:extLst>
                     <a:ext uri="{9D8B030D-6E8A-4147-A177-3AD203B41FA5}">
-                      <a16:colId xmlns:a16="http://schemas.microsoft.com/office/drawing/2014/main" val="20001"/>
+                      <a16:colId xmlns:a16="http://schemas.microsoft.com/office/drawing/2014/main" xmlns="" val="20001"/>
                     </a:ext>
                   </a:extLst>
                 </a:gridCol>
@@ -4327,7 +4327,7 @@
                 </a:tc>
                 <a:extLst>
                   <a:ext uri="{0D108BD9-81ED-4DB2-BD59-A6C34878D82A}">
-                    <a16:rowId xmlns:a16="http://schemas.microsoft.com/office/drawing/2014/main" val="10000"/>
+                    <a16:rowId xmlns:a16="http://schemas.microsoft.com/office/drawing/2014/main" xmlns="" val="10000"/>
                   </a:ext>
                 </a:extLst>
               </a:tr>
@@ -4366,7 +4366,7 @@
                 </a:tc>
                 <a:extLst>
                   <a:ext uri="{0D108BD9-81ED-4DB2-BD59-A6C34878D82A}">
-                    <a16:rowId xmlns:a16="http://schemas.microsoft.com/office/drawing/2014/main" val="10001"/>
+                    <a16:rowId xmlns:a16="http://schemas.microsoft.com/office/drawing/2014/main" xmlns="" val="10001"/>
                   </a:ext>
                 </a:extLst>
               </a:tr>
@@ -4432,7 +4432,7 @@
                 </a:tc>
                 <a:extLst>
                   <a:ext uri="{0D108BD9-81ED-4DB2-BD59-A6C34878D82A}">
-                    <a16:rowId xmlns:a16="http://schemas.microsoft.com/office/drawing/2014/main" val="10002"/>
+                    <a16:rowId xmlns:a16="http://schemas.microsoft.com/office/drawing/2014/main" xmlns="" val="10002"/>
                   </a:ext>
                 </a:extLst>
               </a:tr>
@@ -4471,7 +4471,7 @@
                 </a:tc>
                 <a:extLst>
                   <a:ext uri="{0D108BD9-81ED-4DB2-BD59-A6C34878D82A}">
-                    <a16:rowId xmlns:a16="http://schemas.microsoft.com/office/drawing/2014/main" val="10003"/>
+                    <a16:rowId xmlns:a16="http://schemas.microsoft.com/office/drawing/2014/main" xmlns="" val="10003"/>
                   </a:ext>
                 </a:extLst>
               </a:tr>
@@ -4510,7 +4510,7 @@
                 </a:tc>
                 <a:extLst>
                   <a:ext uri="{0D108BD9-81ED-4DB2-BD59-A6C34878D82A}">
-                    <a16:rowId xmlns:a16="http://schemas.microsoft.com/office/drawing/2014/main" val="10004"/>
+                    <a16:rowId xmlns:a16="http://schemas.microsoft.com/office/drawing/2014/main" xmlns="" val="10004"/>
                   </a:ext>
                 </a:extLst>
               </a:tr>
@@ -6324,11 +6324,15 @@
             </a:r>
             <a:r>
               <a:rPr lang="en-US" sz="2400" dirty="0"/>
-              <a:t>methods and fields are only accessible in the base class and derived </a:t>
-            </a:r>
-            <a:r>
-              <a:rPr lang="en-US" sz="2400" dirty="0" err="1"/>
-              <a:t>clasess</a:t>
+              <a:t>methods and fields are only accessible in the base </a:t>
+            </a:r>
+            <a:r>
+              <a:rPr lang="en-US" sz="2400" dirty="0" smtClean="0"/>
+              <a:t>class, derived classes, and other classes in the </a:t>
+            </a:r>
+            <a:r>
+              <a:rPr lang="en-US" sz="2400" smtClean="0"/>
+              <a:t>base class’ package</a:t>
             </a:r>
             <a:endParaRPr lang="en-US" sz="2400" dirty="0"/>
           </a:p>

</xml_diff>

<commit_message>
week 7: fix notes, again
</commit_message>
<xml_diff>
--- a/week_07_08/week_07_08.pptx
+++ b/week_07_08/week_07_08.pptx
@@ -213,7 +213,7 @@
           <a:p>
             <a:fld id="{A756DEA0-F944-5946-9B95-BC7B5255CD05}" type="datetimeFigureOut">
               <a:rPr lang="en-US" smtClean="0"/>
-              <a:t>10/10/2016</a:t>
+              <a:t>2/28/17</a:t>
             </a:fld>
             <a:endParaRPr lang="en-US"/>
           </a:p>
@@ -900,7 +900,7 @@
           <a:p>
             <a:fld id="{C5EA75F5-9C53-4C57-B9F1-F3208CA9B7F4}" type="datetime1">
               <a:rPr lang="en-US" smtClean="0"/>
-              <a:t>10/10/2016</a:t>
+              <a:t>2/28/17</a:t>
             </a:fld>
             <a:endParaRPr lang="en-US" dirty="0"/>
           </a:p>
@@ -1124,7 +1124,7 @@
           <a:p>
             <a:fld id="{FC196B55-95CD-4416-8964-A30564121383}" type="datetime1">
               <a:rPr lang="en-US" smtClean="0"/>
-              <a:t>10/10/2016</a:t>
+              <a:t>2/28/17</a:t>
             </a:fld>
             <a:endParaRPr lang="en-US" dirty="0"/>
           </a:p>
@@ -1299,7 +1299,7 @@
           <a:p>
             <a:fld id="{70C2EC10-3AAA-4469-8818-D58D91D054BE}" type="datetime1">
               <a:rPr lang="en-US" smtClean="0"/>
-              <a:t>10/10/2016</a:t>
+              <a:t>2/28/17</a:t>
             </a:fld>
             <a:endParaRPr lang="en-US" dirty="0"/>
           </a:p>
@@ -1464,7 +1464,7 @@
           <a:p>
             <a:fld id="{09EF0F6F-D2AB-4DA5-8AD1-6900E3639D38}" type="datetime1">
               <a:rPr lang="en-US" smtClean="0"/>
-              <a:t>10/10/2016</a:t>
+              <a:t>2/28/17</a:t>
             </a:fld>
             <a:endParaRPr lang="en-US" dirty="0"/>
           </a:p>
@@ -1713,7 +1713,7 @@
           <a:p>
             <a:fld id="{989B7EAF-0C39-44E8-8499-6BA407F3AEBC}" type="datetime1">
               <a:rPr lang="en-US" smtClean="0"/>
-              <a:t>10/10/2016</a:t>
+              <a:t>2/28/17</a:t>
             </a:fld>
             <a:endParaRPr lang="en-US" dirty="0"/>
           </a:p>
@@ -2034,7 +2034,7 @@
           <a:p>
             <a:fld id="{5886F527-0E87-4BCD-B70D-567B75B5FC54}" type="datetime1">
               <a:rPr lang="en-US" smtClean="0"/>
-              <a:t>10/10/2016</a:t>
+              <a:t>2/28/17</a:t>
             </a:fld>
             <a:endParaRPr lang="en-US" dirty="0"/>
           </a:p>
@@ -2480,7 +2480,7 @@
           <a:p>
             <a:fld id="{A0DF246D-505E-42AC-8833-29EE4713D20B}" type="datetime1">
               <a:rPr lang="en-US" smtClean="0"/>
-              <a:t>10/10/2016</a:t>
+              <a:t>2/28/17</a:t>
             </a:fld>
             <a:endParaRPr lang="en-US" dirty="0"/>
           </a:p>
@@ -2593,7 +2593,7 @@
           <a:p>
             <a:fld id="{2890B447-952E-4F59-AC1F-0116EA635D33}" type="datetime1">
               <a:rPr lang="en-US" smtClean="0"/>
-              <a:t>10/10/2016</a:t>
+              <a:t>2/28/17</a:t>
             </a:fld>
             <a:endParaRPr lang="en-US" dirty="0"/>
           </a:p>
@@ -2683,7 +2683,7 @@
           <a:p>
             <a:fld id="{3EF54D9E-748D-41D1-8E9A-189407821B85}" type="datetime1">
               <a:rPr lang="en-US" smtClean="0"/>
-              <a:t>10/10/2016</a:t>
+              <a:t>2/28/17</a:t>
             </a:fld>
             <a:endParaRPr lang="en-US" dirty="0"/>
           </a:p>
@@ -2965,7 +2965,7 @@
           <a:p>
             <a:fld id="{7C9B8561-1BBF-41EC-9127-6AF41D23B667}" type="datetime1">
               <a:rPr lang="en-US" smtClean="0"/>
-              <a:t>10/10/2016</a:t>
+              <a:t>2/28/17</a:t>
             </a:fld>
             <a:endParaRPr lang="en-US" dirty="0"/>
           </a:p>
@@ -3285,7 +3285,7 @@
           <a:p>
             <a:fld id="{059F584D-11ED-4273-A4D2-F852542F5BB5}" type="datetime1">
               <a:rPr lang="en-US" smtClean="0"/>
-              <a:t>10/10/2016</a:t>
+              <a:t>2/28/17</a:t>
             </a:fld>
             <a:endParaRPr lang="en-US" dirty="0"/>
           </a:p>
@@ -3534,7 +3534,7 @@
           <a:p>
             <a:fld id="{C347BE70-8F30-4E43-BA14-F2F900FE7F6E}" type="datetime1">
               <a:rPr lang="en-US" smtClean="0"/>
-              <a:t>10/10/2016</a:t>
+              <a:t>2/28/17</a:t>
             </a:fld>
             <a:endParaRPr lang="en-US" dirty="0"/>
           </a:p>
@@ -4274,14 +4274,14 @@
                 <a:gridCol w="3083906">
                   <a:extLst>
                     <a:ext uri="{9D8B030D-6E8A-4147-A177-3AD203B41FA5}">
-                      <a16:colId xmlns:a16="http://schemas.microsoft.com/office/drawing/2014/main" val="20000"/>
+                      <a16:colId xmlns:a16="http://schemas.microsoft.com/office/drawing/2014/main" xmlns="" val="20000"/>
                     </a:ext>
                   </a:extLst>
                 </a:gridCol>
                 <a:gridCol w="5510820">
                   <a:extLst>
                     <a:ext uri="{9D8B030D-6E8A-4147-A177-3AD203B41FA5}">
-                      <a16:colId xmlns:a16="http://schemas.microsoft.com/office/drawing/2014/main" val="20001"/>
+                      <a16:colId xmlns:a16="http://schemas.microsoft.com/office/drawing/2014/main" xmlns="" val="20001"/>
                     </a:ext>
                   </a:extLst>
                 </a:gridCol>
@@ -4327,7 +4327,7 @@
                 </a:tc>
                 <a:extLst>
                   <a:ext uri="{0D108BD9-81ED-4DB2-BD59-A6C34878D82A}">
-                    <a16:rowId xmlns:a16="http://schemas.microsoft.com/office/drawing/2014/main" val="10000"/>
+                    <a16:rowId xmlns:a16="http://schemas.microsoft.com/office/drawing/2014/main" xmlns="" val="10000"/>
                   </a:ext>
                 </a:extLst>
               </a:tr>
@@ -4366,7 +4366,7 @@
                 </a:tc>
                 <a:extLst>
                   <a:ext uri="{0D108BD9-81ED-4DB2-BD59-A6C34878D82A}">
-                    <a16:rowId xmlns:a16="http://schemas.microsoft.com/office/drawing/2014/main" val="10001"/>
+                    <a16:rowId xmlns:a16="http://schemas.microsoft.com/office/drawing/2014/main" xmlns="" val="10001"/>
                   </a:ext>
                 </a:extLst>
               </a:tr>
@@ -4432,7 +4432,7 @@
                 </a:tc>
                 <a:extLst>
                   <a:ext uri="{0D108BD9-81ED-4DB2-BD59-A6C34878D82A}">
-                    <a16:rowId xmlns:a16="http://schemas.microsoft.com/office/drawing/2014/main" val="10002"/>
+                    <a16:rowId xmlns:a16="http://schemas.microsoft.com/office/drawing/2014/main" xmlns="" val="10002"/>
                   </a:ext>
                 </a:extLst>
               </a:tr>
@@ -4471,7 +4471,7 @@
                 </a:tc>
                 <a:extLst>
                   <a:ext uri="{0D108BD9-81ED-4DB2-BD59-A6C34878D82A}">
-                    <a16:rowId xmlns:a16="http://schemas.microsoft.com/office/drawing/2014/main" val="10003"/>
+                    <a16:rowId xmlns:a16="http://schemas.microsoft.com/office/drawing/2014/main" xmlns="" val="10003"/>
                   </a:ext>
                 </a:extLst>
               </a:tr>
@@ -4510,7 +4510,7 @@
                 </a:tc>
                 <a:extLst>
                   <a:ext uri="{0D108BD9-81ED-4DB2-BD59-A6C34878D82A}">
-                    <a16:rowId xmlns:a16="http://schemas.microsoft.com/office/drawing/2014/main" val="10004"/>
+                    <a16:rowId xmlns:a16="http://schemas.microsoft.com/office/drawing/2014/main" xmlns="" val="10004"/>
                   </a:ext>
                 </a:extLst>
               </a:tr>
@@ -6324,11 +6324,15 @@
             </a:r>
             <a:r>
               <a:rPr lang="en-US" sz="2400" dirty="0"/>
-              <a:t>methods and fields are only accessible in the base class and derived </a:t>
-            </a:r>
-            <a:r>
-              <a:rPr lang="en-US" sz="2400" dirty="0" err="1"/>
-              <a:t>clasess</a:t>
+              <a:t>methods and fields are only accessible in the base </a:t>
+            </a:r>
+            <a:r>
+              <a:rPr lang="en-US" sz="2400" dirty="0" smtClean="0"/>
+              <a:t>class, derived classes, and other classes in the </a:t>
+            </a:r>
+            <a:r>
+              <a:rPr lang="en-US" sz="2400" smtClean="0"/>
+              <a:t>base class’ package</a:t>
             </a:r>
             <a:endParaRPr lang="en-US" sz="2400" dirty="0"/>
           </a:p>

</xml_diff>